<commit_message>
Adding images and updating ppt.
</commit_message>
<xml_diff>
--- a/Final Presentation/Bootcamp-Project-1.pptx
+++ b/Final Presentation/Bootcamp-Project-1.pptx
@@ -5,7 +5,7 @@
     <p:sldMasterId id="2147483845" r:id="rId1"/>
   </p:sldMasterIdLst>
   <p:notesMasterIdLst>
-    <p:notesMasterId r:id="rId15"/>
+    <p:notesMasterId r:id="rId16"/>
   </p:notesMasterIdLst>
   <p:sldIdLst>
     <p:sldId id="256" r:id="rId2"/>
@@ -16,11 +16,12 @@
     <p:sldId id="260" r:id="rId7"/>
     <p:sldId id="265" r:id="rId8"/>
     <p:sldId id="259" r:id="rId9"/>
-    <p:sldId id="267" r:id="rId10"/>
-    <p:sldId id="264" r:id="rId11"/>
-    <p:sldId id="268" r:id="rId12"/>
-    <p:sldId id="261" r:id="rId13"/>
-    <p:sldId id="262" r:id="rId14"/>
+    <p:sldId id="269" r:id="rId10"/>
+    <p:sldId id="267" r:id="rId11"/>
+    <p:sldId id="264" r:id="rId12"/>
+    <p:sldId id="268" r:id="rId13"/>
+    <p:sldId id="261" r:id="rId14"/>
+    <p:sldId id="262" r:id="rId15"/>
   </p:sldIdLst>
   <p:sldSz cx="12192000" cy="6858000"/>
   <p:notesSz cx="6858000" cy="9144000"/>
@@ -605,8 +606,32 @@
           <a:lstStyle/>
           <a:p>
             <a:r>
-              <a:rPr lang="en-US" dirty="0"/>
-              <a:t>Lauren</a:t>
+              <a:rPr lang="en-US" dirty="0" err="1"/>
+              <a:t>Siara</a:t>
+            </a:r>
+            <a:endParaRPr lang="en-US" dirty="0"/>
+          </a:p>
+          <a:p>
+            <a:endParaRPr lang="en-US" dirty="0"/>
+          </a:p>
+          <a:p>
+            <a:r>
+              <a:rPr lang="en-US" dirty="0">
+                <a:latin typeface="Tahoma" panose="020B0604030504040204" pitchFamily="34" charset="0"/>
+                <a:ea typeface="Tahoma" panose="020B0604030504040204" pitchFamily="34" charset="0"/>
+                <a:cs typeface="Tahoma" panose="020B0604030504040204" pitchFamily="34" charset="0"/>
+              </a:rPr>
+              <a:t>We noticed a large spike in purchasing items that can be used for home entertainment. </a:t>
+            </a:r>
+          </a:p>
+          <a:p>
+            <a:r>
+              <a:rPr lang="en-US" dirty="0">
+                <a:latin typeface="Tahoma" panose="020B0604030504040204" pitchFamily="34" charset="0"/>
+                <a:ea typeface="Tahoma" panose="020B0604030504040204" pitchFamily="34" charset="0"/>
+                <a:cs typeface="Tahoma" panose="020B0604030504040204" pitchFamily="34" charset="0"/>
+              </a:rPr>
+              <a:t>You can use these types of items for fun without needing to be in a large group. </a:t>
             </a:r>
           </a:p>
         </p:txBody>
@@ -637,7 +662,7 @@
     </p:spTree>
     <p:extLst>
       <p:ext uri="{BB962C8B-B14F-4D97-AF65-F5344CB8AC3E}">
-        <p14:creationId xmlns:p14="http://schemas.microsoft.com/office/powerpoint/2010/main" val="3034710620"/>
+        <p14:creationId xmlns:p14="http://schemas.microsoft.com/office/powerpoint/2010/main" val="1392474627"/>
       </p:ext>
     </p:extLst>
   </p:cSld>
@@ -693,7 +718,7 @@
           <a:p>
             <a:r>
               <a:rPr lang="en-US" dirty="0"/>
-              <a:t>Danica</a:t>
+              <a:t>Lauren</a:t>
             </a:r>
           </a:p>
         </p:txBody>
@@ -724,7 +749,7 @@
     </p:spTree>
     <p:extLst>
       <p:ext uri="{BB962C8B-B14F-4D97-AF65-F5344CB8AC3E}">
-        <p14:creationId xmlns:p14="http://schemas.microsoft.com/office/powerpoint/2010/main" val="3577662982"/>
+        <p14:creationId xmlns:p14="http://schemas.microsoft.com/office/powerpoint/2010/main" val="3034710620"/>
       </p:ext>
     </p:extLst>
   </p:cSld>
@@ -780,7 +805,16 @@
           <a:p>
             <a:r>
               <a:rPr lang="en-US" dirty="0"/>
-              <a:t>Stacey</a:t>
+              <a:t>Danica</a:t>
+            </a:r>
+          </a:p>
+          <a:p>
+            <a:endParaRPr lang="en-US" dirty="0"/>
+          </a:p>
+          <a:p>
+            <a:r>
+              <a:rPr lang="en-US" dirty="0"/>
+              <a:t>Note from Siara: I added a tobacco graph in case we are short on time, but I don’t think we will be. It’s a just-in-case and we can delete it if we don’t need it.</a:t>
             </a:r>
           </a:p>
         </p:txBody>
@@ -811,7 +845,7 @@
     </p:spTree>
     <p:extLst>
       <p:ext uri="{BB962C8B-B14F-4D97-AF65-F5344CB8AC3E}">
-        <p14:creationId xmlns:p14="http://schemas.microsoft.com/office/powerpoint/2010/main" val="3765332774"/>
+        <p14:creationId xmlns:p14="http://schemas.microsoft.com/office/powerpoint/2010/main" val="3577662982"/>
       </p:ext>
     </p:extLst>
   </p:cSld>
@@ -867,19 +901,7 @@
           <a:p>
             <a:r>
               <a:rPr lang="en-US" dirty="0"/>
-              <a:t>Lauren</a:t>
-            </a:r>
-          </a:p>
-          <a:p>
-            <a:r>
-              <a:rPr lang="en-US" dirty="0"/>
-              <a:t>Conclusions – how to prepare for for an apocalypse (what items to have on hand) and then how to thrive post apocalypse economy</a:t>
-            </a:r>
-          </a:p>
-          <a:p>
-            <a:r>
-              <a:rPr lang="en-US" dirty="0"/>
-              <a:t>Mention items to barter</a:t>
+              <a:t>Stacey</a:t>
             </a:r>
           </a:p>
         </p:txBody>
@@ -902,6 +924,167 @@
             <a:fld id="{6BB3D874-D54A-734A-BDC6-E6BE85812225}" type="slidenum">
               <a:rPr lang="en-US" smtClean="0"/>
               <a:t>13</a:t>
+            </a:fld>
+            <a:endParaRPr lang="en-US"/>
+          </a:p>
+        </p:txBody>
+      </p:sp>
+    </p:spTree>
+    <p:extLst>
+      <p:ext uri="{BB962C8B-B14F-4D97-AF65-F5344CB8AC3E}">
+        <p14:creationId xmlns:p14="http://schemas.microsoft.com/office/powerpoint/2010/main" val="3765332774"/>
+      </p:ext>
+    </p:extLst>
+  </p:cSld>
+  <p:clrMapOvr>
+    <a:masterClrMapping/>
+  </p:clrMapOvr>
+</p:notes>
+</file>
+
+<file path=ppt/notesSlides/notesSlide14.xml><?xml version="1.0" encoding="utf-8"?>
+<p:notes xmlns:a="http://schemas.openxmlformats.org/drawingml/2006/main" xmlns:r="http://schemas.openxmlformats.org/officeDocument/2006/relationships" xmlns:p="http://schemas.openxmlformats.org/presentationml/2006/main">
+  <p:cSld>
+    <p:spTree>
+      <p:nvGrpSpPr>
+        <p:cNvPr id="1" name=""/>
+        <p:cNvGrpSpPr/>
+        <p:nvPr/>
+      </p:nvGrpSpPr>
+      <p:grpSpPr>
+        <a:xfrm>
+          <a:off x="0" y="0"/>
+          <a:ext cx="0" cy="0"/>
+          <a:chOff x="0" y="0"/>
+          <a:chExt cx="0" cy="0"/>
+        </a:xfrm>
+      </p:grpSpPr>
+      <p:sp>
+        <p:nvSpPr>
+          <p:cNvPr id="2" name="Slide Image Placeholder 1"/>
+          <p:cNvSpPr>
+            <a:spLocks noGrp="1" noRot="1" noChangeAspect="1"/>
+          </p:cNvSpPr>
+          <p:nvPr>
+            <p:ph type="sldImg"/>
+          </p:nvPr>
+        </p:nvSpPr>
+        <p:spPr/>
+      </p:sp>
+      <p:sp>
+        <p:nvSpPr>
+          <p:cNvPr id="3" name="Notes Placeholder 2"/>
+          <p:cNvSpPr>
+            <a:spLocks noGrp="1"/>
+          </p:cNvSpPr>
+          <p:nvPr>
+            <p:ph type="body" idx="1"/>
+          </p:nvPr>
+        </p:nvSpPr>
+        <p:spPr/>
+        <p:txBody>
+          <a:bodyPr/>
+          <a:lstStyle/>
+          <a:p>
+            <a:r>
+              <a:rPr lang="en-US" dirty="0"/>
+              <a:t>Lauren</a:t>
+            </a:r>
+          </a:p>
+          <a:p>
+            <a:r>
+              <a:rPr lang="en-US" dirty="0"/>
+              <a:t>Conclusions – how to prepare for for an apocalypse (what items to have on hand) and then how to thrive post apocalypse economy</a:t>
+            </a:r>
+          </a:p>
+          <a:p>
+            <a:r>
+              <a:rPr lang="en-US" dirty="0"/>
+              <a:t>Mention items to barter</a:t>
+            </a:r>
+          </a:p>
+          <a:p>
+            <a:endParaRPr lang="en-US" dirty="0"/>
+          </a:p>
+          <a:p>
+            <a:r>
+              <a:rPr lang="en-US" dirty="0"/>
+              <a:t>Notes from Siara:</a:t>
+            </a:r>
+          </a:p>
+          <a:p>
+            <a:r>
+              <a:rPr lang="en-US" dirty="0">
+                <a:latin typeface="Tahoma" panose="020B0604030504040204" pitchFamily="34" charset="0"/>
+                <a:ea typeface="Tahoma" panose="020B0604030504040204" pitchFamily="34" charset="0"/>
+                <a:cs typeface="Tahoma" panose="020B0604030504040204" pitchFamily="34" charset="0"/>
+              </a:rPr>
+              <a:t>First question: Items to include in a Doomsday Bunker:</a:t>
+            </a:r>
+          </a:p>
+          <a:p>
+            <a:r>
+              <a:rPr lang="en-US" dirty="0">
+                <a:latin typeface="Tahoma" panose="020B0604030504040204" pitchFamily="34" charset="0"/>
+                <a:ea typeface="Tahoma" panose="020B0604030504040204" pitchFamily="34" charset="0"/>
+                <a:cs typeface="Tahoma" panose="020B0604030504040204" pitchFamily="34" charset="0"/>
+              </a:rPr>
+              <a:t>Food, Household Cleaning Products, Household Paper Products</a:t>
+            </a:r>
+          </a:p>
+          <a:p>
+            <a:r>
+              <a:rPr lang="en-US" dirty="0">
+                <a:latin typeface="Tahoma" panose="020B0604030504040204" pitchFamily="34" charset="0"/>
+                <a:ea typeface="Tahoma" panose="020B0604030504040204" pitchFamily="34" charset="0"/>
+                <a:cs typeface="Tahoma" panose="020B0604030504040204" pitchFamily="34" charset="0"/>
+              </a:rPr>
+              <a:t>Second question: Items to buy while others are panicking:</a:t>
+            </a:r>
+          </a:p>
+          <a:p>
+            <a:r>
+              <a:rPr lang="en-US" dirty="0">
+                <a:latin typeface="Tahoma" panose="020B0604030504040204" pitchFamily="34" charset="0"/>
+                <a:ea typeface="Tahoma" panose="020B0604030504040204" pitchFamily="34" charset="0"/>
+                <a:cs typeface="Tahoma" panose="020B0604030504040204" pitchFamily="34" charset="0"/>
+              </a:rPr>
+              <a:t>At-home productivity items, at-home comfort items, at-home </a:t>
+            </a:r>
+            <a:r>
+              <a:rPr lang="en-US">
+                <a:latin typeface="Tahoma" panose="020B0604030504040204" pitchFamily="34" charset="0"/>
+                <a:ea typeface="Tahoma" panose="020B0604030504040204" pitchFamily="34" charset="0"/>
+                <a:cs typeface="Tahoma" panose="020B0604030504040204" pitchFamily="34" charset="0"/>
+              </a:rPr>
+              <a:t>entertainment items</a:t>
+            </a:r>
+            <a:endParaRPr lang="en-US" dirty="0">
+              <a:latin typeface="Tahoma" panose="020B0604030504040204" pitchFamily="34" charset="0"/>
+              <a:ea typeface="Tahoma" panose="020B0604030504040204" pitchFamily="34" charset="0"/>
+              <a:cs typeface="Tahoma" panose="020B0604030504040204" pitchFamily="34" charset="0"/>
+            </a:endParaRPr>
+          </a:p>
+        </p:txBody>
+      </p:sp>
+      <p:sp>
+        <p:nvSpPr>
+          <p:cNvPr id="4" name="Slide Number Placeholder 3"/>
+          <p:cNvSpPr>
+            <a:spLocks noGrp="1"/>
+          </p:cNvSpPr>
+          <p:nvPr>
+            <p:ph type="sldNum" sz="quarter" idx="5"/>
+          </p:nvPr>
+        </p:nvSpPr>
+        <p:spPr/>
+        <p:txBody>
+          <a:bodyPr/>
+          <a:lstStyle/>
+          <a:p>
+            <a:fld id="{6BB3D874-D54A-734A-BDC6-E6BE85812225}" type="slidenum">
+              <a:rPr lang="en-US" smtClean="0"/>
+              <a:t>14</a:t>
             </a:fld>
             <a:endParaRPr lang="en-US"/>
           </a:p>
@@ -1337,6 +1520,23 @@
             </a:r>
           </a:p>
           <a:p>
+            <a:endParaRPr lang="en-US" dirty="0">
+              <a:latin typeface="Tahoma" panose="020B0604030504040204" pitchFamily="34" charset="0"/>
+              <a:ea typeface="Tahoma" panose="020B0604030504040204" pitchFamily="34" charset="0"/>
+              <a:cs typeface="Tahoma" panose="020B0604030504040204" pitchFamily="34" charset="0"/>
+            </a:endParaRPr>
+          </a:p>
+          <a:p>
+            <a:r>
+              <a:rPr lang="en-US" dirty="0">
+                <a:latin typeface="Tahoma" panose="020B0604030504040204" pitchFamily="34" charset="0"/>
+                <a:ea typeface="Tahoma" panose="020B0604030504040204" pitchFamily="34" charset="0"/>
+                <a:cs typeface="Tahoma" panose="020B0604030504040204" pitchFamily="34" charset="0"/>
+              </a:rPr>
+              <a:t>Question from Siara: Would it make more sense to include the food purchase graph instead of the gasoline graph? The food graph has a similar shape to the other two graphs, and I feel like that is an important trend we noticed that we haven’t really highlighted. I added a graph but we can definitely delete it if it doesn’t make sense.</a:t>
+            </a:r>
+          </a:p>
+          <a:p>
             <a:endParaRPr lang="en-US" dirty="0"/>
           </a:p>
         </p:txBody>
@@ -1596,10 +1796,18 @@
           <a:lstStyle/>
           <a:p>
             <a:r>
-              <a:rPr lang="en-US" dirty="0" err="1"/>
+              <a:rPr lang="en-US" dirty="0"/>
               <a:t>Siara</a:t>
             </a:r>
+          </a:p>
+          <a:p>
             <a:endParaRPr lang="en-US" dirty="0"/>
+          </a:p>
+          <a:p>
+            <a:r>
+              <a:rPr lang="en-US" dirty="0"/>
+              <a:t>As people adjust to life in an apocalyptic world where they do not get to venture out of the house as much, they need to find ways to stay productive. These purchasing trends reflect this.</a:t>
+            </a:r>
           </a:p>
         </p:txBody>
       </p:sp>
@@ -1684,79 +1892,8 @@
           <a:lstStyle/>
           <a:p>
             <a:r>
-              <a:rPr lang="en-US" dirty="0" err="1"/>
-              <a:t>Siara</a:t>
-            </a:r>
-            <a:endParaRPr lang="en-US" dirty="0"/>
-          </a:p>
-          <a:p>
-            <a:endParaRPr lang="en-US" dirty="0"/>
-          </a:p>
-          <a:p>
-            <a:r>
-              <a:rPr lang="en-US" dirty="0">
-                <a:latin typeface="Tahoma" panose="020B0604030504040204" pitchFamily="34" charset="0"/>
-                <a:ea typeface="Tahoma" panose="020B0604030504040204" pitchFamily="34" charset="0"/>
-                <a:cs typeface="Tahoma" panose="020B0604030504040204" pitchFamily="34" charset="0"/>
-              </a:rPr>
-              <a:t>Not part of the initial spike but items we saw an increase in post new-normal</a:t>
-            </a:r>
-          </a:p>
-          <a:p>
-            <a:endParaRPr lang="en-US" dirty="0">
-              <a:latin typeface="Tahoma" panose="020B0604030504040204" pitchFamily="34" charset="0"/>
-              <a:ea typeface="Tahoma" panose="020B0604030504040204" pitchFamily="34" charset="0"/>
-              <a:cs typeface="Tahoma" panose="020B0604030504040204" pitchFamily="34" charset="0"/>
-            </a:endParaRPr>
-          </a:p>
-          <a:p>
-            <a:r>
-              <a:rPr lang="en-US" dirty="0">
-                <a:latin typeface="Tahoma" panose="020B0604030504040204" pitchFamily="34" charset="0"/>
-                <a:ea typeface="Tahoma" panose="020B0604030504040204" pitchFamily="34" charset="0"/>
-                <a:cs typeface="Tahoma" panose="020B0604030504040204" pitchFamily="34" charset="0"/>
-              </a:rPr>
-              <a:t>recreational vehicles</a:t>
-            </a:r>
-          </a:p>
-          <a:p>
-            <a:r>
-              <a:rPr lang="en-US" dirty="0">
-                <a:latin typeface="Tahoma" panose="020B0604030504040204" pitchFamily="34" charset="0"/>
-                <a:ea typeface="Tahoma" panose="020B0604030504040204" pitchFamily="34" charset="0"/>
-                <a:cs typeface="Tahoma" panose="020B0604030504040204" pitchFamily="34" charset="0"/>
-              </a:rPr>
-              <a:t>Small appliance</a:t>
-            </a:r>
-          </a:p>
-          <a:p>
-            <a:r>
-              <a:rPr lang="en-US" dirty="0">
-                <a:latin typeface="Tahoma" panose="020B0604030504040204" pitchFamily="34" charset="0"/>
-                <a:ea typeface="Tahoma" panose="020B0604030504040204" pitchFamily="34" charset="0"/>
-                <a:cs typeface="Tahoma" panose="020B0604030504040204" pitchFamily="34" charset="0"/>
-              </a:rPr>
-              <a:t>Sporting eq, guns and ammunition</a:t>
-            </a:r>
-          </a:p>
-          <a:p>
-            <a:r>
-              <a:rPr lang="en-US" dirty="0">
-                <a:latin typeface="Tahoma" panose="020B0604030504040204" pitchFamily="34" charset="0"/>
-                <a:ea typeface="Tahoma" panose="020B0604030504040204" pitchFamily="34" charset="0"/>
-                <a:cs typeface="Tahoma" panose="020B0604030504040204" pitchFamily="34" charset="0"/>
-              </a:rPr>
-              <a:t>Gardening</a:t>
-            </a:r>
-          </a:p>
-          <a:p>
-            <a:r>
-              <a:rPr lang="en-US" dirty="0">
-                <a:latin typeface="Tahoma" panose="020B0604030504040204" pitchFamily="34" charset="0"/>
-                <a:ea typeface="Tahoma" panose="020B0604030504040204" pitchFamily="34" charset="0"/>
-                <a:cs typeface="Tahoma" panose="020B0604030504040204" pitchFamily="34" charset="0"/>
-              </a:rPr>
-              <a:t>Personal computers</a:t>
+              <a:rPr lang="en-US" dirty="0"/>
+              <a:t>As people are spending more time at home, they want to feel comfortable and safe.</a:t>
             </a:r>
           </a:p>
           <a:p>
@@ -1790,7 +1927,7 @@
     </p:spTree>
     <p:extLst>
       <p:ext uri="{BB962C8B-B14F-4D97-AF65-F5344CB8AC3E}">
-        <p14:creationId xmlns:p14="http://schemas.microsoft.com/office/powerpoint/2010/main" val="1392474627"/>
+        <p14:creationId xmlns:p14="http://schemas.microsoft.com/office/powerpoint/2010/main" val="1193286432"/>
       </p:ext>
     </p:extLst>
   </p:cSld>
@@ -4841,20 +4978,8 @@
           </a:p>
           <a:p>
             <a:r>
-              <a:rPr lang="en-US" sz="2600" dirty="0" err="1"/>
-              <a:t>Siara</a:t>
-            </a:r>
-            <a:r>
               <a:rPr lang="en-US" sz="2600" dirty="0"/>
-              <a:t> </a:t>
-            </a:r>
-            <a:r>
-              <a:rPr lang="en-US" sz="2600" dirty="0" err="1"/>
-              <a:t>Leninger</a:t>
-            </a:r>
-            <a:r>
-              <a:rPr lang="en-US" sz="2600" dirty="0"/>
-              <a:t>, Stacey Wai</a:t>
+              <a:t>Siara Leininger, Stacey Wai</a:t>
             </a:r>
           </a:p>
           <a:p>
@@ -4876,6 +5001,128 @@
 </file>
 
 <file path=ppt/slides/slide10.xml><?xml version="1.0" encoding="utf-8"?>
+<p:sld xmlns:a="http://schemas.openxmlformats.org/drawingml/2006/main" xmlns:r="http://schemas.openxmlformats.org/officeDocument/2006/relationships" xmlns:p="http://schemas.openxmlformats.org/presentationml/2006/main">
+  <p:cSld>
+    <p:spTree>
+      <p:nvGrpSpPr>
+        <p:cNvPr id="1" name=""/>
+        <p:cNvGrpSpPr/>
+        <p:nvPr/>
+      </p:nvGrpSpPr>
+      <p:grpSpPr>
+        <a:xfrm>
+          <a:off x="0" y="0"/>
+          <a:ext cx="0" cy="0"/>
+          <a:chOff x="0" y="0"/>
+          <a:chExt cx="0" cy="0"/>
+        </a:xfrm>
+      </p:grpSpPr>
+      <p:sp>
+        <p:nvSpPr>
+          <p:cNvPr id="2" name="Title 1">
+            <a:extLst>
+              <a:ext uri="{FF2B5EF4-FFF2-40B4-BE49-F238E27FC236}">
+                <a16:creationId xmlns:a16="http://schemas.microsoft.com/office/drawing/2014/main" id="{2E80B52C-7AB8-4842-9CC9-20E991098D71}"/>
+              </a:ext>
+            </a:extLst>
+          </p:cNvPr>
+          <p:cNvSpPr>
+            <a:spLocks noGrp="1"/>
+          </p:cNvSpPr>
+          <p:nvPr>
+            <p:ph type="title"/>
+          </p:nvPr>
+        </p:nvSpPr>
+        <p:spPr/>
+        <p:txBody>
+          <a:bodyPr/>
+          <a:lstStyle/>
+          <a:p>
+            <a:r>
+              <a:rPr lang="en-US" b="1" dirty="0">
+                <a:latin typeface="Tahoma" panose="020B0604030504040204" pitchFamily="34" charset="0"/>
+                <a:ea typeface="Tahoma" panose="020B0604030504040204" pitchFamily="34" charset="0"/>
+                <a:cs typeface="Tahoma" panose="020B0604030504040204" pitchFamily="34" charset="0"/>
+              </a:rPr>
+              <a:t>Being entertained in a new world</a:t>
+            </a:r>
+          </a:p>
+        </p:txBody>
+      </p:sp>
+      <p:pic>
+        <p:nvPicPr>
+          <p:cNvPr id="10" name="Picture 9" descr="Chart, line chart&#10;&#10;Description automatically generated">
+            <a:extLst>
+              <a:ext uri="{FF2B5EF4-FFF2-40B4-BE49-F238E27FC236}">
+                <a16:creationId xmlns:a16="http://schemas.microsoft.com/office/drawing/2014/main" id="{CF847E69-6685-3C4F-A836-D0DFF3501625}"/>
+              </a:ext>
+            </a:extLst>
+          </p:cNvPr>
+          <p:cNvPicPr>
+            <a:picLocks noChangeAspect="1"/>
+          </p:cNvPicPr>
+          <p:nvPr/>
+        </p:nvPicPr>
+        <p:blipFill>
+          <a:blip r:embed="rId3"/>
+          <a:stretch>
+            <a:fillRect/>
+          </a:stretch>
+        </p:blipFill>
+        <p:spPr>
+          <a:xfrm>
+            <a:off x="6324600" y="1690688"/>
+            <a:ext cx="5486399" cy="3657599"/>
+          </a:xfrm>
+          <a:prstGeom prst="rect">
+            <a:avLst/>
+          </a:prstGeom>
+        </p:spPr>
+      </p:pic>
+      <p:pic>
+        <p:nvPicPr>
+          <p:cNvPr id="9" name="Picture 8">
+            <a:extLst>
+              <a:ext uri="{FF2B5EF4-FFF2-40B4-BE49-F238E27FC236}">
+                <a16:creationId xmlns:a16="http://schemas.microsoft.com/office/drawing/2014/main" id="{2F0F607E-B40B-F343-B5B2-84241F89A275}"/>
+              </a:ext>
+            </a:extLst>
+          </p:cNvPr>
+          <p:cNvPicPr>
+            <a:picLocks noChangeAspect="1"/>
+          </p:cNvPicPr>
+          <p:nvPr/>
+        </p:nvPicPr>
+        <p:blipFill>
+          <a:blip r:embed="rId4"/>
+          <a:stretch>
+            <a:fillRect/>
+          </a:stretch>
+        </p:blipFill>
+        <p:spPr>
+          <a:xfrm>
+            <a:off x="838200" y="1690687"/>
+            <a:ext cx="5486400" cy="3657600"/>
+          </a:xfrm>
+          <a:prstGeom prst="rect">
+            <a:avLst/>
+          </a:prstGeom>
+        </p:spPr>
+      </p:pic>
+    </p:spTree>
+    <p:extLst>
+      <p:ext uri="{BB962C8B-B14F-4D97-AF65-F5344CB8AC3E}">
+        <p14:creationId xmlns:p14="http://schemas.microsoft.com/office/powerpoint/2010/main" val="3727549512"/>
+      </p:ext>
+    </p:extLst>
+  </p:cSld>
+  <p:clrMapOvr>
+    <a:masterClrMapping/>
+  </p:clrMapOvr>
+</p:sld>
+</file>
+
+<file path=ppt/slides/slide11.xml><?xml version="1.0" encoding="utf-8"?>
 <p:sld xmlns:a="http://schemas.openxmlformats.org/drawingml/2006/main" xmlns:r="http://schemas.openxmlformats.org/officeDocument/2006/relationships" xmlns:p="http://schemas.openxmlformats.org/presentationml/2006/main">
   <p:cSld>
     <p:spTree>
@@ -5155,7 +5402,7 @@
 </p:sld>
 </file>
 
-<file path=ppt/slides/slide11.xml><?xml version="1.0" encoding="utf-8"?>
+<file path=ppt/slides/slide12.xml><?xml version="1.0" encoding="utf-8"?>
 <p:sld xmlns:a="http://schemas.openxmlformats.org/drawingml/2006/main" xmlns:r="http://schemas.openxmlformats.org/officeDocument/2006/relationships" xmlns:p="http://schemas.openxmlformats.org/presentationml/2006/main">
   <p:cSld>
     <p:spTree>
@@ -5269,6 +5516,36 @@
           </a:p>
         </p:txBody>
       </p:sp>
+      <p:pic>
+        <p:nvPicPr>
+          <p:cNvPr id="3" name="Picture 2" descr="Chart, line chart&#10;&#10;Description automatically generated">
+            <a:extLst>
+              <a:ext uri="{FF2B5EF4-FFF2-40B4-BE49-F238E27FC236}">
+                <a16:creationId xmlns:a16="http://schemas.microsoft.com/office/drawing/2014/main" id="{A13D5D7F-0FA7-7E41-AE11-74C573F114D9}"/>
+              </a:ext>
+            </a:extLst>
+          </p:cNvPr>
+          <p:cNvPicPr>
+            <a:picLocks noChangeAspect="1"/>
+          </p:cNvPicPr>
+          <p:nvPr/>
+        </p:nvPicPr>
+        <p:blipFill>
+          <a:blip r:embed="rId5"/>
+          <a:stretch>
+            <a:fillRect/>
+          </a:stretch>
+        </p:blipFill>
+        <p:spPr>
+          <a:xfrm>
+            <a:off x="2762952" y="7126446"/>
+            <a:ext cx="5486400" cy="3657600"/>
+          </a:xfrm>
+          <a:prstGeom prst="rect">
+            <a:avLst/>
+          </a:prstGeom>
+        </p:spPr>
+      </p:pic>
     </p:spTree>
     <p:extLst>
       <p:ext uri="{BB962C8B-B14F-4D97-AF65-F5344CB8AC3E}">
@@ -5282,7 +5559,7 @@
 </p:sld>
 </file>
 
-<file path=ppt/slides/slide12.xml><?xml version="1.0" encoding="utf-8"?>
+<file path=ppt/slides/slide13.xml><?xml version="1.0" encoding="utf-8"?>
 <p:sld xmlns:a="http://schemas.openxmlformats.org/drawingml/2006/main" xmlns:r="http://schemas.openxmlformats.org/officeDocument/2006/relationships" xmlns:p="http://schemas.openxmlformats.org/presentationml/2006/main">
   <p:cSld>
     <p:spTree>
@@ -5383,20 +5660,12 @@
           </a:p>
           <a:p>
             <a:r>
-              <a:rPr lang="en-US" dirty="0" err="1">
-                <a:latin typeface="Tahoma" panose="020B0604030504040204" pitchFamily="34" charset="0"/>
-                <a:ea typeface="Tahoma" panose="020B0604030504040204" pitchFamily="34" charset="0"/>
-                <a:cs typeface="Tahoma" panose="020B0604030504040204" pitchFamily="34" charset="0"/>
-              </a:rPr>
-              <a:t>Tieing</a:t>
-            </a:r>
-            <a:r>
               <a:rPr lang="en-US" dirty="0">
                 <a:latin typeface="Tahoma" panose="020B0604030504040204" pitchFamily="34" charset="0"/>
                 <a:ea typeface="Tahoma" panose="020B0604030504040204" pitchFamily="34" charset="0"/>
                 <a:cs typeface="Tahoma" panose="020B0604030504040204" pitchFamily="34" charset="0"/>
               </a:rPr>
-              <a:t> our findings together cohesively</a:t>
+              <a:t>Tying our findings together cohesively</a:t>
             </a:r>
           </a:p>
           <a:p>
@@ -5420,7 +5689,7 @@
 </p:sld>
 </file>
 
-<file path=ppt/slides/slide13.xml><?xml version="1.0" encoding="utf-8"?>
+<file path=ppt/slides/slide14.xml><?xml version="1.0" encoding="utf-8"?>
 <p:sld xmlns:a="http://schemas.openxmlformats.org/drawingml/2006/main" xmlns:r="http://schemas.openxmlformats.org/officeDocument/2006/relationships" xmlns:p="http://schemas.openxmlformats.org/presentationml/2006/main">
   <p:cSld>
     <p:spTree>
@@ -7720,6 +7989,36 @@
           </a:prstGeom>
         </p:spPr>
       </p:pic>
+      <p:pic>
+        <p:nvPicPr>
+          <p:cNvPr id="4" name="Picture 3">
+            <a:extLst>
+              <a:ext uri="{FF2B5EF4-FFF2-40B4-BE49-F238E27FC236}">
+                <a16:creationId xmlns:a16="http://schemas.microsoft.com/office/drawing/2014/main" id="{4A4632CF-B240-7C47-9FD0-54769ECC0077}"/>
+              </a:ext>
+            </a:extLst>
+          </p:cNvPr>
+          <p:cNvPicPr>
+            <a:picLocks noChangeAspect="1"/>
+          </p:cNvPicPr>
+          <p:nvPr/>
+        </p:nvPicPr>
+        <p:blipFill>
+          <a:blip r:embed="rId7"/>
+          <a:stretch>
+            <a:fillRect/>
+          </a:stretch>
+        </p:blipFill>
+        <p:spPr>
+          <a:xfrm>
+            <a:off x="405409" y="4277140"/>
+            <a:ext cx="5486400" cy="3657600"/>
+          </a:xfrm>
+          <a:prstGeom prst="rect">
+            <a:avLst/>
+          </a:prstGeom>
+        </p:spPr>
+      </p:pic>
     </p:spTree>
     <p:extLst>
       <p:ext uri="{BB962C8B-B14F-4D97-AF65-F5344CB8AC3E}">
@@ -8828,38 +9127,8 @@
         </p:blipFill>
         <p:spPr>
           <a:xfrm>
-            <a:off x="643968" y="2091016"/>
+            <a:off x="233151" y="2055812"/>
             <a:ext cx="5716815" cy="3811210"/>
-          </a:xfrm>
-          <a:prstGeom prst="rect">
-            <a:avLst/>
-          </a:prstGeom>
-        </p:spPr>
-      </p:pic>
-      <p:pic>
-        <p:nvPicPr>
-          <p:cNvPr id="8" name="Picture 7" descr="Chart, line chart&#10;&#10;Description automatically generated">
-            <a:extLst>
-              <a:ext uri="{FF2B5EF4-FFF2-40B4-BE49-F238E27FC236}">
-                <a16:creationId xmlns:a16="http://schemas.microsoft.com/office/drawing/2014/main" id="{DD9C21EB-7D2F-3847-9A4F-46DEC1E2E7E8}"/>
-              </a:ext>
-            </a:extLst>
-          </p:cNvPr>
-          <p:cNvPicPr>
-            <a:picLocks noChangeAspect="1"/>
-          </p:cNvPicPr>
-          <p:nvPr/>
-        </p:nvPicPr>
-        <p:blipFill>
-          <a:blip r:embed="rId5"/>
-          <a:stretch>
-            <a:fillRect/>
-          </a:stretch>
-        </p:blipFill>
-        <p:spPr>
-          <a:xfrm>
-            <a:off x="7346882" y="3590347"/>
-            <a:ext cx="4603604" cy="3069069"/>
           </a:xfrm>
           <a:prstGeom prst="rect">
             <a:avLst/>
@@ -8881,15 +9150,15 @@
           <p:nvPr/>
         </p:nvPicPr>
         <p:blipFill>
-          <a:blip r:embed="rId6"/>
+          <a:blip r:embed="rId5"/>
           <a:stretch>
             <a:fillRect/>
           </a:stretch>
         </p:blipFill>
         <p:spPr>
           <a:xfrm>
-            <a:off x="7346881" y="260639"/>
-            <a:ext cx="4603605" cy="3069070"/>
+            <a:off x="6312777" y="2039732"/>
+            <a:ext cx="5716814" cy="3811209"/>
           </a:xfrm>
           <a:prstGeom prst="rect">
             <a:avLst/>
@@ -8931,7 +9200,7 @@
           <p:cNvPr id="2" name="Title 1">
             <a:extLst>
               <a:ext uri="{FF2B5EF4-FFF2-40B4-BE49-F238E27FC236}">
-                <a16:creationId xmlns:a16="http://schemas.microsoft.com/office/drawing/2014/main" id="{2E80B52C-7AB8-4842-9CC9-20E991098D71}"/>
+                <a16:creationId xmlns:a16="http://schemas.microsoft.com/office/drawing/2014/main" id="{13407C09-C539-984B-8EEA-C3127B426FF1}"/>
               </a:ext>
             </a:extLst>
           </p:cNvPr>
@@ -8953,17 +9222,58 @@
                 <a:ea typeface="Tahoma" panose="020B0604030504040204" pitchFamily="34" charset="0"/>
                 <a:cs typeface="Tahoma" panose="020B0604030504040204" pitchFamily="34" charset="0"/>
               </a:rPr>
-              <a:t>New ways to socialize</a:t>
-            </a:r>
+              <a:t>Being comfortable in a </a:t>
+            </a:r>
+            <a:br>
+              <a:rPr lang="en-US" b="1" dirty="0">
+                <a:latin typeface="Tahoma" panose="020B0604030504040204" pitchFamily="34" charset="0"/>
+                <a:ea typeface="Tahoma" panose="020B0604030504040204" pitchFamily="34" charset="0"/>
+                <a:cs typeface="Tahoma" panose="020B0604030504040204" pitchFamily="34" charset="0"/>
+              </a:rPr>
+            </a:br>
+            <a:r>
+              <a:rPr lang="en-US" b="1" dirty="0">
+                <a:latin typeface="Tahoma" panose="020B0604030504040204" pitchFamily="34" charset="0"/>
+                <a:ea typeface="Tahoma" panose="020B0604030504040204" pitchFamily="34" charset="0"/>
+                <a:cs typeface="Tahoma" panose="020B0604030504040204" pitchFamily="34" charset="0"/>
+              </a:rPr>
+              <a:t>new world</a:t>
+            </a:r>
+            <a:endParaRPr lang="en-US" dirty="0"/>
+          </a:p>
+        </p:txBody>
+      </p:sp>
+      <p:sp>
+        <p:nvSpPr>
+          <p:cNvPr id="3" name="Content Placeholder 2">
+            <a:extLst>
+              <a:ext uri="{FF2B5EF4-FFF2-40B4-BE49-F238E27FC236}">
+                <a16:creationId xmlns:a16="http://schemas.microsoft.com/office/drawing/2014/main" id="{1133BB6D-62AB-8B4B-A451-B292873FF4DF}"/>
+              </a:ext>
+            </a:extLst>
+          </p:cNvPr>
+          <p:cNvSpPr>
+            <a:spLocks noGrp="1"/>
+          </p:cNvSpPr>
+          <p:nvPr>
+            <p:ph idx="1"/>
+          </p:nvPr>
+        </p:nvSpPr>
+        <p:spPr/>
+        <p:txBody>
+          <a:bodyPr/>
+          <a:lstStyle/>
+          <a:p>
+            <a:endParaRPr lang="en-US"/>
           </a:p>
         </p:txBody>
       </p:sp>
       <p:pic>
         <p:nvPicPr>
-          <p:cNvPr id="7" name="Picture 6" descr="Chart, line chart&#10;&#10;Description automatically generated">
+          <p:cNvPr id="4" name="Picture 3" descr="Chart, line chart&#10;&#10;Description automatically generated">
             <a:extLst>
               <a:ext uri="{FF2B5EF4-FFF2-40B4-BE49-F238E27FC236}">
-                <a16:creationId xmlns:a16="http://schemas.microsoft.com/office/drawing/2014/main" id="{E4030504-7E27-DF44-A4BB-36771D06FD5B}"/>
+                <a16:creationId xmlns:a16="http://schemas.microsoft.com/office/drawing/2014/main" id="{7E8DA867-BCB8-8940-9CAA-FDF735467096}"/>
               </a:ext>
             </a:extLst>
           </p:cNvPr>
@@ -8980,8 +9290,8 @@
         </p:blipFill>
         <p:spPr>
           <a:xfrm>
-            <a:off x="480448" y="1600200"/>
-            <a:ext cx="5486400" cy="3657600"/>
+            <a:off x="6324600" y="1690688"/>
+            <a:ext cx="5514925" cy="3676616"/>
           </a:xfrm>
           <a:prstGeom prst="rect">
             <a:avLst/>
@@ -8990,10 +9300,10 @@
       </p:pic>
       <p:pic>
         <p:nvPicPr>
-          <p:cNvPr id="10" name="Picture 9" descr="Chart, line chart&#10;&#10;Description automatically generated">
+          <p:cNvPr id="5" name="Picture 4" descr="Chart, line chart&#10;&#10;Description automatically generated">
             <a:extLst>
               <a:ext uri="{FF2B5EF4-FFF2-40B4-BE49-F238E27FC236}">
-                <a16:creationId xmlns:a16="http://schemas.microsoft.com/office/drawing/2014/main" id="{CF847E69-6685-3C4F-A836-D0DFF3501625}"/>
+                <a16:creationId xmlns:a16="http://schemas.microsoft.com/office/drawing/2014/main" id="{CCCC9C7D-60D6-5044-9A53-1DA59EC72127}"/>
               </a:ext>
             </a:extLst>
           </p:cNvPr>
@@ -9010,8 +9320,8 @@
         </p:blipFill>
         <p:spPr>
           <a:xfrm>
-            <a:off x="6581615" y="2047150"/>
-            <a:ext cx="5486399" cy="3657599"/>
+            <a:off x="480448" y="1709704"/>
+            <a:ext cx="5486400" cy="3657600"/>
           </a:xfrm>
           <a:prstGeom prst="rect">
             <a:avLst/>
@@ -9021,7 +9331,7 @@
     </p:spTree>
     <p:extLst>
       <p:ext uri="{BB962C8B-B14F-4D97-AF65-F5344CB8AC3E}">
-        <p14:creationId xmlns:p14="http://schemas.microsoft.com/office/powerpoint/2010/main" val="3727549512"/>
+        <p14:creationId xmlns:p14="http://schemas.microsoft.com/office/powerpoint/2010/main" val="4118114868"/>
       </p:ext>
     </p:extLst>
   </p:cSld>

</xml_diff>